<commit_message>
fix first-five-prov provnm bug
</commit_message>
<xml_diff>
--- a/dist/ana-template.pptx
+++ b/dist/ana-template.pptx
@@ -106,7 +106,7 @@
   </p:defaultTextStyle>
   <p:extLst>
     <p:ext uri="{EFAFB233-063F-42B5-8137-9DF3F51BA10A}">
-      <p15:sldGuideLst xmlns="" xmlns:p15="http://schemas.microsoft.com/office/powerpoint/2012/main">
+      <p15:sldGuideLst xmlns:p15="http://schemas.microsoft.com/office/powerpoint/2012/main" xmlns="">
         <p15:guide id="1" orient="horz" pos="2160">
           <p15:clr>
             <a:srgbClr val="A4A3A4"/>
@@ -206,7 +206,7 @@
             <a:fld id="{206B670E-6783-4B6E-A540-E5929245093B}" type="datetimeFigureOut">
               <a:rPr lang="zh-CN" altLang="en-US" smtClean="0"/>
               <a:pPr/>
-              <a:t>2016/7/29</a:t>
+              <a:t>2016/9/7</a:t>
             </a:fld>
             <a:endParaRPr lang="zh-CN" altLang="en-US"/>
           </a:p>
@@ -377,7 +377,7 @@
     </p:spTree>
     <p:extLst>
       <p:ext uri="{BB962C8B-B14F-4D97-AF65-F5344CB8AC3E}">
-        <p14:creationId xmlns="" xmlns:p14="http://schemas.microsoft.com/office/powerpoint/2010/main" val="3941864840"/>
+        <p14:creationId xmlns:p14="http://schemas.microsoft.com/office/powerpoint/2010/main" xmlns="" val="3941864840"/>
       </p:ext>
     </p:extLst>
   </p:cSld>

</xml_diff>